<commit_message>
slight changed to graphics.
</commit_message>
<xml_diff>
--- a/images/research.pptx
+++ b/images/research.pptx
@@ -4619,7 +4619,7 @@
         <a:lstStyle/>
         <a:p>
           <a:r>
-            <a:rPr lang="en-US" sz="1600" smtClean="0"/>
+            <a:rPr lang="en-US" sz="1600" dirty="0" smtClean="0"/>
             <a:t>Vision</a:t>
           </a:r>
           <a:endParaRPr lang="en-US" sz="1600" dirty="0"/>
@@ -4732,6 +4732,13 @@
         </dgm:presLayoutVars>
       </dgm:prSet>
       <dgm:spPr/>
+      <dgm:t>
+        <a:bodyPr/>
+        <a:lstStyle/>
+        <a:p>
+          <a:endParaRPr lang="en-US"/>
+        </a:p>
+      </dgm:t>
     </dgm:pt>
     <dgm:pt modelId="{DD810EFA-8815-4115-930F-119246F06465}" type="pres">
       <dgm:prSet presAssocID="{9D427DDB-022D-470E-9D58-EE40886559D5}" presName="Accent1" presStyleCnt="0"/>
@@ -4742,7 +4749,7 @@
       <dgm:spPr/>
     </dgm:pt>
     <dgm:pt modelId="{932EDE09-1A92-4A84-B4DA-141725FFF851}" type="pres">
-      <dgm:prSet presAssocID="{9D427DDB-022D-470E-9D58-EE40886559D5}" presName="Parent1" presStyleLbl="revTx" presStyleIdx="0" presStyleCnt="3" custScaleX="386619" custScaleY="387961" custLinFactX="62153" custLinFactY="100000" custLinFactNeighborX="100000" custLinFactNeighborY="142320">
+      <dgm:prSet presAssocID="{9D427DDB-022D-470E-9D58-EE40886559D5}" presName="Parent1" presStyleLbl="revTx" presStyleIdx="0" presStyleCnt="3" custScaleX="386619" custScaleY="387961" custLinFactX="-100000" custLinFactY="100000" custLinFactNeighborX="-174043" custLinFactNeighborY="142320">
         <dgm:presLayoutVars>
           <dgm:chMax val="1"/>
           <dgm:chPref val="1"/>
@@ -4775,6 +4782,13 @@
         </dgm:presLayoutVars>
       </dgm:prSet>
       <dgm:spPr/>
+      <dgm:t>
+        <a:bodyPr/>
+        <a:lstStyle/>
+        <a:p>
+          <a:endParaRPr lang="en-US"/>
+        </a:p>
+      </dgm:t>
     </dgm:pt>
     <dgm:pt modelId="{4E91D977-0149-4B47-9ED1-C53A3E4085B5}" type="pres">
       <dgm:prSet presAssocID="{5B54F67F-3620-4EF1-AE33-D80DA4DA1A22}" presName="Accent3" presStyleCnt="0"/>
@@ -4793,16 +4807,23 @@
         </dgm:presLayoutVars>
       </dgm:prSet>
       <dgm:spPr/>
+      <dgm:t>
+        <a:bodyPr/>
+        <a:lstStyle/>
+        <a:p>
+          <a:endParaRPr lang="en-US"/>
+        </a:p>
+      </dgm:t>
     </dgm:pt>
   </dgm:ptLst>
   <dgm:cxnLst>
+    <dgm:cxn modelId="{C710263C-A0AD-4EEA-B413-66407596DE78}" srcId="{373A95AD-8651-49D1-9C6D-D0522859B904}" destId="{190D2D77-951B-47FB-AF03-C5EBC03C020A}" srcOrd="1" destOrd="0" parTransId="{EB6F1C15-3721-4CAF-82F3-B9CE40F26055}" sibTransId="{76A64321-FD6D-4FD1-8307-04639F009FB3}"/>
     <dgm:cxn modelId="{B2063B9B-3304-44D2-9938-0E34F4FD5E92}" srcId="{373A95AD-8651-49D1-9C6D-D0522859B904}" destId="{5B54F67F-3620-4EF1-AE33-D80DA4DA1A22}" srcOrd="2" destOrd="0" parTransId="{F44D26C2-BE09-4655-9F6F-55C7F9824D2F}" sibTransId="{5CC04077-0D0E-4333-8667-08FDBE396E42}"/>
-    <dgm:cxn modelId="{A82015D9-CBDB-42A5-A5B5-204F98C630CF}" type="presOf" srcId="{190D2D77-951B-47FB-AF03-C5EBC03C020A}" destId="{FFF44F5E-E1C8-42F0-8077-89D792F0E41E}" srcOrd="0" destOrd="0" presId="urn:microsoft.com/office/officeart/2009/layout/CircleArrowProcess"/>
+    <dgm:cxn modelId="{8BA3F032-CBCE-4ADB-9E03-F9D22A981CEC}" srcId="{373A95AD-8651-49D1-9C6D-D0522859B904}" destId="{9D427DDB-022D-470E-9D58-EE40886559D5}" srcOrd="0" destOrd="0" parTransId="{0B22ACFC-2594-4172-80B2-79DC4DE77EE4}" sibTransId="{A82BC04C-E6C2-4B1B-BEF5-1F979631D76D}"/>
     <dgm:cxn modelId="{A3A75EEE-8209-4D59-BC22-AF24FFF66EB3}" type="presOf" srcId="{5B54F67F-3620-4EF1-AE33-D80DA4DA1A22}" destId="{20D007B4-D60E-43CF-83AC-6105DDACFFFC}" srcOrd="0" destOrd="0" presId="urn:microsoft.com/office/officeart/2009/layout/CircleArrowProcess"/>
     <dgm:cxn modelId="{D91C6F71-8CCF-49AD-8C0A-067A7373610D}" type="presOf" srcId="{9D427DDB-022D-470E-9D58-EE40886559D5}" destId="{932EDE09-1A92-4A84-B4DA-141725FFF851}" srcOrd="0" destOrd="0" presId="urn:microsoft.com/office/officeart/2009/layout/CircleArrowProcess"/>
-    <dgm:cxn modelId="{C710263C-A0AD-4EEA-B413-66407596DE78}" srcId="{373A95AD-8651-49D1-9C6D-D0522859B904}" destId="{190D2D77-951B-47FB-AF03-C5EBC03C020A}" srcOrd="1" destOrd="0" parTransId="{EB6F1C15-3721-4CAF-82F3-B9CE40F26055}" sibTransId="{76A64321-FD6D-4FD1-8307-04639F009FB3}"/>
     <dgm:cxn modelId="{73D75530-245B-4A3A-B31D-611714F85148}" type="presOf" srcId="{373A95AD-8651-49D1-9C6D-D0522859B904}" destId="{24875994-1B27-4A45-B493-17F25A412377}" srcOrd="0" destOrd="0" presId="urn:microsoft.com/office/officeart/2009/layout/CircleArrowProcess"/>
-    <dgm:cxn modelId="{8BA3F032-CBCE-4ADB-9E03-F9D22A981CEC}" srcId="{373A95AD-8651-49D1-9C6D-D0522859B904}" destId="{9D427DDB-022D-470E-9D58-EE40886559D5}" srcOrd="0" destOrd="0" parTransId="{0B22ACFC-2594-4172-80B2-79DC4DE77EE4}" sibTransId="{A82BC04C-E6C2-4B1B-BEF5-1F979631D76D}"/>
+    <dgm:cxn modelId="{A82015D9-CBDB-42A5-A5B5-204F98C630CF}" type="presOf" srcId="{190D2D77-951B-47FB-AF03-C5EBC03C020A}" destId="{FFF44F5E-E1C8-42F0-8077-89D792F0E41E}" srcOrd="0" destOrd="0" presId="urn:microsoft.com/office/officeart/2009/layout/CircleArrowProcess"/>
     <dgm:cxn modelId="{FA45E951-3C17-4F01-AC2C-E9127AE27384}" type="presParOf" srcId="{24875994-1B27-4A45-B493-17F25A412377}" destId="{DD810EFA-8815-4115-930F-119246F06465}" srcOrd="0" destOrd="0" presId="urn:microsoft.com/office/officeart/2009/layout/CircleArrowProcess"/>
     <dgm:cxn modelId="{BE5D8DCA-0A97-43A5-A3FB-56F84C137A12}" type="presParOf" srcId="{DD810EFA-8815-4115-930F-119246F06465}" destId="{7379ECE4-62B9-409A-8F1E-A2174E041A39}" srcOrd="0" destOrd="0" presId="urn:microsoft.com/office/officeart/2009/layout/CircleArrowProcess"/>
     <dgm:cxn modelId="{9F531B18-4967-4954-88A6-2C61400E1AD1}" type="presParOf" srcId="{24875994-1B27-4A45-B493-17F25A412377}" destId="{932EDE09-1A92-4A84-B4DA-141725FFF851}" srcOrd="1" destOrd="0" presId="urn:microsoft.com/office/officeart/2009/layout/CircleArrowProcess"/>
@@ -4957,9 +4978,16 @@
         </dgm:presLayoutVars>
       </dgm:prSet>
       <dgm:spPr/>
+      <dgm:t>
+        <a:bodyPr/>
+        <a:lstStyle/>
+        <a:p>
+          <a:endParaRPr lang="en-US"/>
+        </a:p>
+      </dgm:t>
     </dgm:pt>
     <dgm:pt modelId="{9088CEB1-8723-45F3-BBCE-4476473605D5}" type="pres">
-      <dgm:prSet presAssocID="{9D427DDB-022D-470E-9D58-EE40886559D5}" presName="parent_text_1" presStyleLbl="revTx" presStyleIdx="0" presStyleCnt="3" custScaleX="127610" custScaleY="145587">
+      <dgm:prSet presAssocID="{9D427DDB-022D-470E-9D58-EE40886559D5}" presName="parent_text_1" presStyleLbl="revTx" presStyleIdx="0" presStyleCnt="3" custScaleX="127610" custScaleY="145587" custLinFactNeighborY="-28882">
         <dgm:presLayoutVars>
           <dgm:chMax val="0"/>
           <dgm:chPref val="0"/>
@@ -4967,6 +4995,13 @@
         </dgm:presLayoutVars>
       </dgm:prSet>
       <dgm:spPr/>
+      <dgm:t>
+        <a:bodyPr/>
+        <a:lstStyle/>
+        <a:p>
+          <a:endParaRPr lang="en-US"/>
+        </a:p>
+      </dgm:t>
     </dgm:pt>
     <dgm:pt modelId="{F20D931B-08D8-472A-A12E-9D62857D1D79}" type="pres">
       <dgm:prSet presAssocID="{9D427DDB-022D-470E-9D58-EE40886559D5}" presName="image_accent_1" presStyleCnt="0"/>
@@ -4987,6 +5022,13 @@
     <dgm:pt modelId="{DC219B51-B4D3-48FD-89E8-F4C51984E6F7}" type="pres">
       <dgm:prSet presAssocID="{A82BC04C-E6C2-4B1B-BEF5-1F979631D76D}" presName="imageRepeatNode" presStyleLbl="fgImgPlace1" presStyleIdx="0" presStyleCnt="3"/>
       <dgm:spPr/>
+      <dgm:t>
+        <a:bodyPr/>
+        <a:lstStyle/>
+        <a:p>
+          <a:endParaRPr lang="en-US"/>
+        </a:p>
+      </dgm:t>
     </dgm:pt>
     <dgm:pt modelId="{43482FEE-E6EF-49C8-85A0-8DA72D335FB3}" type="pres">
       <dgm:prSet presAssocID="{190D2D77-951B-47FB-AF03-C5EBC03C020A}" presName="parent_text_2" presStyleLbl="revTx" presStyleIdx="1" presStyleCnt="3">
@@ -4997,6 +5039,13 @@
         </dgm:presLayoutVars>
       </dgm:prSet>
       <dgm:spPr/>
+      <dgm:t>
+        <a:bodyPr/>
+        <a:lstStyle/>
+        <a:p>
+          <a:endParaRPr lang="en-US"/>
+        </a:p>
+      </dgm:t>
     </dgm:pt>
     <dgm:pt modelId="{22073511-1786-4D90-8DB1-D539EA6C8A21}" type="pres">
       <dgm:prSet presAssocID="{190D2D77-951B-47FB-AF03-C5EBC03C020A}" presName="image_accent_2" presStyleCnt="0"/>
@@ -5013,6 +5062,13 @@
     <dgm:pt modelId="{804CD868-D08E-471B-B824-45F95B979FC6}" type="pres">
       <dgm:prSet presAssocID="{76A64321-FD6D-4FD1-8307-04639F009FB3}" presName="imageRepeatNode" presStyleLbl="fgImgPlace1" presStyleIdx="1" presStyleCnt="3"/>
       <dgm:spPr/>
+      <dgm:t>
+        <a:bodyPr/>
+        <a:lstStyle/>
+        <a:p>
+          <a:endParaRPr lang="en-US"/>
+        </a:p>
+      </dgm:t>
     </dgm:pt>
     <dgm:pt modelId="{A5971B93-852E-4E31-A4A0-5EE90F4553CB}" type="pres">
       <dgm:prSet presAssocID="{5B54F67F-3620-4EF1-AE33-D80DA4DA1A22}" presName="image_accent_3" presStyleCnt="0"/>
@@ -5031,6 +5087,13 @@
         </dgm:presLayoutVars>
       </dgm:prSet>
       <dgm:spPr/>
+      <dgm:t>
+        <a:bodyPr/>
+        <a:lstStyle/>
+        <a:p>
+          <a:endParaRPr lang="en-US"/>
+        </a:p>
+      </dgm:t>
     </dgm:pt>
     <dgm:pt modelId="{23E68F47-CB50-4C23-A285-ED482D38A5A7}" type="pres">
       <dgm:prSet presAssocID="{5B54F67F-3620-4EF1-AE33-D80DA4DA1A22}" presName="accent_2" presStyleLbl="alignNode1" presStyleIdx="4" presStyleCnt="6"/>
@@ -5047,6 +5110,13 @@
     <dgm:pt modelId="{A10ADB7F-F587-40D3-AF8D-0531D80F77BC}" type="pres">
       <dgm:prSet presAssocID="{5CC04077-0D0E-4333-8667-08FDBE396E42}" presName="imageRepeatNode" presStyleLbl="fgImgPlace1" presStyleIdx="2" presStyleCnt="3"/>
       <dgm:spPr/>
+      <dgm:t>
+        <a:bodyPr/>
+        <a:lstStyle/>
+        <a:p>
+          <a:endParaRPr lang="en-US"/>
+        </a:p>
+      </dgm:t>
     </dgm:pt>
   </dgm:ptLst>
   <dgm:cxnLst>
@@ -5058,8 +5128,8 @@
     <dgm:cxn modelId="{8BA3F032-CBCE-4ADB-9E03-F9D22A981CEC}" srcId="{373A95AD-8651-49D1-9C6D-D0522859B904}" destId="{9D427DDB-022D-470E-9D58-EE40886559D5}" srcOrd="0" destOrd="0" parTransId="{0B22ACFC-2594-4172-80B2-79DC4DE77EE4}" sibTransId="{A82BC04C-E6C2-4B1B-BEF5-1F979631D76D}"/>
     <dgm:cxn modelId="{CB6F6ACD-1E57-4D4E-9A06-DCCC2F15A2E6}" type="presOf" srcId="{190D2D77-951B-47FB-AF03-C5EBC03C020A}" destId="{43482FEE-E6EF-49C8-85A0-8DA72D335FB3}" srcOrd="0" destOrd="0" presId="urn:microsoft.com/office/officeart/2008/layout/BubblePictureList"/>
     <dgm:cxn modelId="{FE9B00E6-98B1-4D4E-A2B3-E58C2C779935}" type="presOf" srcId="{373A95AD-8651-49D1-9C6D-D0522859B904}" destId="{A9C72E59-B08B-42CE-9F63-86FD3FC593CB}" srcOrd="0" destOrd="0" presId="urn:microsoft.com/office/officeart/2008/layout/BubblePictureList"/>
+    <dgm:cxn modelId="{CF0E5B64-AE8A-4FDF-A819-A88AA881201F}" type="presOf" srcId="{76A64321-FD6D-4FD1-8307-04639F009FB3}" destId="{804CD868-D08E-471B-B824-45F95B979FC6}" srcOrd="0" destOrd="0" presId="urn:microsoft.com/office/officeart/2008/layout/BubblePictureList"/>
     <dgm:cxn modelId="{131FA9E8-EEDB-401D-9ED0-1F55DA5714BD}" type="presOf" srcId="{9D427DDB-022D-470E-9D58-EE40886559D5}" destId="{9088CEB1-8723-45F3-BBCE-4476473605D5}" srcOrd="0" destOrd="0" presId="urn:microsoft.com/office/officeart/2008/layout/BubblePictureList"/>
-    <dgm:cxn modelId="{CF0E5B64-AE8A-4FDF-A819-A88AA881201F}" type="presOf" srcId="{76A64321-FD6D-4FD1-8307-04639F009FB3}" destId="{804CD868-D08E-471B-B824-45F95B979FC6}" srcOrd="0" destOrd="0" presId="urn:microsoft.com/office/officeart/2008/layout/BubblePictureList"/>
     <dgm:cxn modelId="{D125ED5A-C26A-4CD2-B85F-A7905A077691}" type="presParOf" srcId="{A9C72E59-B08B-42CE-9F63-86FD3FC593CB}" destId="{9088CEB1-8723-45F3-BBCE-4476473605D5}" srcOrd="0" destOrd="0" presId="urn:microsoft.com/office/officeart/2008/layout/BubblePictureList"/>
     <dgm:cxn modelId="{06B9D96B-37E2-4B75-BF1D-93ED24B29F45}" type="presParOf" srcId="{A9C72E59-B08B-42CE-9F63-86FD3FC593CB}" destId="{F20D931B-08D8-472A-A12E-9D62857D1D79}" srcOrd="1" destOrd="0" presId="urn:microsoft.com/office/officeart/2008/layout/BubblePictureList"/>
     <dgm:cxn modelId="{D7F1A7BE-1F4E-4C2A-8050-7C106ABFC39F}" type="presParOf" srcId="{F20D931B-08D8-472A-A12E-9D62857D1D79}" destId="{84F46DD8-2357-4A3E-99AB-F0EE1936F519}" srcOrd="0" destOrd="0" presId="urn:microsoft.com/office/officeart/2008/layout/BubblePictureList"/>
@@ -5223,6 +5293,13 @@
         </dgm:presLayoutVars>
       </dgm:prSet>
       <dgm:spPr/>
+      <dgm:t>
+        <a:bodyPr/>
+        <a:lstStyle/>
+        <a:p>
+          <a:endParaRPr lang="en-US"/>
+        </a:p>
+      </dgm:t>
     </dgm:pt>
     <dgm:pt modelId="{2F506076-7A94-4EFF-8224-DA4C55BA34E0}" type="pres">
       <dgm:prSet presAssocID="{9D427DDB-022D-470E-9D58-EE40886559D5}" presName="gear1" presStyleLbl="node1" presStyleIdx="0" presStyleCnt="3">
@@ -5243,10 +5320,24 @@
     <dgm:pt modelId="{D4D6B176-A647-4863-8675-57A146B9B52B}" type="pres">
       <dgm:prSet presAssocID="{9D427DDB-022D-470E-9D58-EE40886559D5}" presName="gear1srcNode" presStyleLbl="node1" presStyleIdx="0" presStyleCnt="3"/>
       <dgm:spPr/>
+      <dgm:t>
+        <a:bodyPr/>
+        <a:lstStyle/>
+        <a:p>
+          <a:endParaRPr lang="en-US"/>
+        </a:p>
+      </dgm:t>
     </dgm:pt>
     <dgm:pt modelId="{F3AE0212-F716-45B7-9F90-4B6D58D1B930}" type="pres">
       <dgm:prSet presAssocID="{9D427DDB-022D-470E-9D58-EE40886559D5}" presName="gear1dstNode" presStyleLbl="node1" presStyleIdx="0" presStyleCnt="3"/>
       <dgm:spPr/>
+      <dgm:t>
+        <a:bodyPr/>
+        <a:lstStyle/>
+        <a:p>
+          <a:endParaRPr lang="en-US"/>
+        </a:p>
+      </dgm:t>
     </dgm:pt>
     <dgm:pt modelId="{BDE34D51-35A8-4375-9A87-D3EC23A96084}" type="pres">
       <dgm:prSet presAssocID="{190D2D77-951B-47FB-AF03-C5EBC03C020A}" presName="gear2" presStyleLbl="node1" presStyleIdx="1" presStyleCnt="3">
@@ -5256,18 +5347,46 @@
         </dgm:presLayoutVars>
       </dgm:prSet>
       <dgm:spPr/>
+      <dgm:t>
+        <a:bodyPr/>
+        <a:lstStyle/>
+        <a:p>
+          <a:endParaRPr lang="en-US"/>
+        </a:p>
+      </dgm:t>
     </dgm:pt>
     <dgm:pt modelId="{D0BC0A31-5624-43DB-A4FE-CFF688CA8066}" type="pres">
       <dgm:prSet presAssocID="{190D2D77-951B-47FB-AF03-C5EBC03C020A}" presName="gear2srcNode" presStyleLbl="node1" presStyleIdx="1" presStyleCnt="3"/>
       <dgm:spPr/>
+      <dgm:t>
+        <a:bodyPr/>
+        <a:lstStyle/>
+        <a:p>
+          <a:endParaRPr lang="en-US"/>
+        </a:p>
+      </dgm:t>
     </dgm:pt>
     <dgm:pt modelId="{878207DE-D66F-4C1F-A328-E193A8AA0350}" type="pres">
       <dgm:prSet presAssocID="{190D2D77-951B-47FB-AF03-C5EBC03C020A}" presName="gear2dstNode" presStyleLbl="node1" presStyleIdx="1" presStyleCnt="3"/>
       <dgm:spPr/>
+      <dgm:t>
+        <a:bodyPr/>
+        <a:lstStyle/>
+        <a:p>
+          <a:endParaRPr lang="en-US"/>
+        </a:p>
+      </dgm:t>
     </dgm:pt>
     <dgm:pt modelId="{9730C633-3EF0-476E-A67C-63A17C201E32}" type="pres">
       <dgm:prSet presAssocID="{5B54F67F-3620-4EF1-AE33-D80DA4DA1A22}" presName="gear3" presStyleLbl="node1" presStyleIdx="2" presStyleCnt="3"/>
       <dgm:spPr/>
+      <dgm:t>
+        <a:bodyPr/>
+        <a:lstStyle/>
+        <a:p>
+          <a:endParaRPr lang="en-US"/>
+        </a:p>
+      </dgm:t>
     </dgm:pt>
     <dgm:pt modelId="{2662400B-8F6E-4725-B522-FB50840550DD}" type="pres">
       <dgm:prSet presAssocID="{5B54F67F-3620-4EF1-AE33-D80DA4DA1A22}" presName="gear3tx" presStyleLbl="node1" presStyleIdx="2" presStyleCnt="3">
@@ -5277,26 +5396,68 @@
         </dgm:presLayoutVars>
       </dgm:prSet>
       <dgm:spPr/>
+      <dgm:t>
+        <a:bodyPr/>
+        <a:lstStyle/>
+        <a:p>
+          <a:endParaRPr lang="en-US"/>
+        </a:p>
+      </dgm:t>
     </dgm:pt>
     <dgm:pt modelId="{92BA3AB5-FAEC-484F-BD52-A236584884F4}" type="pres">
       <dgm:prSet presAssocID="{5B54F67F-3620-4EF1-AE33-D80DA4DA1A22}" presName="gear3srcNode" presStyleLbl="node1" presStyleIdx="2" presStyleCnt="3"/>
       <dgm:spPr/>
+      <dgm:t>
+        <a:bodyPr/>
+        <a:lstStyle/>
+        <a:p>
+          <a:endParaRPr lang="en-US"/>
+        </a:p>
+      </dgm:t>
     </dgm:pt>
     <dgm:pt modelId="{326F126A-FB31-4F8A-AC5D-A2F6460C1FBE}" type="pres">
       <dgm:prSet presAssocID="{5B54F67F-3620-4EF1-AE33-D80DA4DA1A22}" presName="gear3dstNode" presStyleLbl="node1" presStyleIdx="2" presStyleCnt="3"/>
       <dgm:spPr/>
+      <dgm:t>
+        <a:bodyPr/>
+        <a:lstStyle/>
+        <a:p>
+          <a:endParaRPr lang="en-US"/>
+        </a:p>
+      </dgm:t>
     </dgm:pt>
     <dgm:pt modelId="{7E8117C5-FAF0-47CA-BDC4-9D8174A6E870}" type="pres">
       <dgm:prSet presAssocID="{A82BC04C-E6C2-4B1B-BEF5-1F979631D76D}" presName="connector1" presStyleLbl="sibTrans2D1" presStyleIdx="0" presStyleCnt="3"/>
       <dgm:spPr/>
+      <dgm:t>
+        <a:bodyPr/>
+        <a:lstStyle/>
+        <a:p>
+          <a:endParaRPr lang="en-US"/>
+        </a:p>
+      </dgm:t>
     </dgm:pt>
     <dgm:pt modelId="{158BA1AA-FAE6-4458-8CF2-D9ACB32C3708}" type="pres">
       <dgm:prSet presAssocID="{76A64321-FD6D-4FD1-8307-04639F009FB3}" presName="connector2" presStyleLbl="sibTrans2D1" presStyleIdx="1" presStyleCnt="3"/>
       <dgm:spPr/>
+      <dgm:t>
+        <a:bodyPr/>
+        <a:lstStyle/>
+        <a:p>
+          <a:endParaRPr lang="en-US"/>
+        </a:p>
+      </dgm:t>
     </dgm:pt>
     <dgm:pt modelId="{BA9E58B5-816B-46BA-97F7-4454CEDF6690}" type="pres">
       <dgm:prSet presAssocID="{5CC04077-0D0E-4333-8667-08FDBE396E42}" presName="connector3" presStyleLbl="sibTrans2D1" presStyleIdx="2" presStyleCnt="3"/>
       <dgm:spPr/>
+      <dgm:t>
+        <a:bodyPr/>
+        <a:lstStyle/>
+        <a:p>
+          <a:endParaRPr lang="en-US"/>
+        </a:p>
+      </dgm:t>
     </dgm:pt>
   </dgm:ptLst>
   <dgm:cxnLst>
@@ -5400,7 +5561,7 @@
         <a:lstStyle/>
         <a:p>
           <a:r>
-            <a:rPr lang="en-US" smtClean="0"/>
+            <a:rPr lang="en-US" dirty="0" smtClean="0"/>
             <a:t> </a:t>
           </a:r>
           <a:endParaRPr lang="en-US" dirty="0"/>
@@ -5474,6 +5635,13 @@
         </dgm:presLayoutVars>
       </dgm:prSet>
       <dgm:spPr/>
+      <dgm:t>
+        <a:bodyPr/>
+        <a:lstStyle/>
+        <a:p>
+          <a:endParaRPr lang="en-US"/>
+        </a:p>
+      </dgm:t>
     </dgm:pt>
     <dgm:pt modelId="{47D9A8BB-9D11-44B0-AD1B-D12B264BBFF1}" type="pres">
       <dgm:prSet presAssocID="{9D427DDB-022D-470E-9D58-EE40886559D5}" presName="text1" presStyleCnt="0"/>
@@ -5511,6 +5679,13 @@
     <dgm:pt modelId="{ACDA988F-0C91-4F16-838A-55BC2EB25148}" type="pres">
       <dgm:prSet presAssocID="{A82BC04C-E6C2-4B1B-BEF5-1F979631D76D}" presName="imageRepeatNode" presStyleLbl="alignAcc1" presStyleIdx="0" presStyleCnt="3"/>
       <dgm:spPr/>
+      <dgm:t>
+        <a:bodyPr/>
+        <a:lstStyle/>
+        <a:p>
+          <a:endParaRPr lang="en-US"/>
+        </a:p>
+      </dgm:t>
     </dgm:pt>
     <dgm:pt modelId="{CA78A94D-DD4C-4FEA-9F92-7C0918389FFE}" type="pres">
       <dgm:prSet presAssocID="{A82BC04C-E6C2-4B1B-BEF5-1F979631D76D}" presName="imageaccent1" presStyleCnt="0"/>
@@ -5533,6 +5708,13 @@
         </dgm:presLayoutVars>
       </dgm:prSet>
       <dgm:spPr/>
+      <dgm:t>
+        <a:bodyPr/>
+        <a:lstStyle/>
+        <a:p>
+          <a:endParaRPr lang="en-US"/>
+        </a:p>
+      </dgm:t>
     </dgm:pt>
     <dgm:pt modelId="{53094A37-0903-42C6-8217-4191F5E8EFE9}" type="pres">
       <dgm:prSet presAssocID="{190D2D77-951B-47FB-AF03-C5EBC03C020A}" presName="textaccent2" presStyleCnt="0"/>
@@ -5549,6 +5731,13 @@
     <dgm:pt modelId="{8BAF9C75-494D-458A-9D7F-7CD6278D61C8}" type="pres">
       <dgm:prSet presAssocID="{76A64321-FD6D-4FD1-8307-04639F009FB3}" presName="imageRepeatNode" presStyleLbl="alignAcc1" presStyleIdx="1" presStyleCnt="3"/>
       <dgm:spPr/>
+      <dgm:t>
+        <a:bodyPr/>
+        <a:lstStyle/>
+        <a:p>
+          <a:endParaRPr lang="en-US"/>
+        </a:p>
+      </dgm:t>
     </dgm:pt>
     <dgm:pt modelId="{E1ABE862-1F39-44F2-878A-BA6C48B809B3}" type="pres">
       <dgm:prSet presAssocID="{76A64321-FD6D-4FD1-8307-04639F009FB3}" presName="imageaccent2" presStyleCnt="0"/>
@@ -5571,6 +5760,13 @@
         </dgm:presLayoutVars>
       </dgm:prSet>
       <dgm:spPr/>
+      <dgm:t>
+        <a:bodyPr/>
+        <a:lstStyle/>
+        <a:p>
+          <a:endParaRPr lang="en-US"/>
+        </a:p>
+      </dgm:t>
     </dgm:pt>
     <dgm:pt modelId="{92762580-6B2C-4C58-BE31-6D9626E7781C}" type="pres">
       <dgm:prSet presAssocID="{5B54F67F-3620-4EF1-AE33-D80DA4DA1A22}" presName="textaccent3" presStyleCnt="0"/>
@@ -5587,6 +5783,13 @@
     <dgm:pt modelId="{78DA7A8D-10E3-4BDE-8D25-7F08876EF7A3}" type="pres">
       <dgm:prSet presAssocID="{5CC04077-0D0E-4333-8667-08FDBE396E42}" presName="imageRepeatNode" presStyleLbl="alignAcc1" presStyleIdx="2" presStyleCnt="3"/>
       <dgm:spPr/>
+      <dgm:t>
+        <a:bodyPr/>
+        <a:lstStyle/>
+        <a:p>
+          <a:endParaRPr lang="en-US"/>
+        </a:p>
+      </dgm:t>
     </dgm:pt>
     <dgm:pt modelId="{19976BC6-59F6-4B23-A7F9-500B8A4309D7}" type="pres">
       <dgm:prSet presAssocID="{5CC04077-0D0E-4333-8667-08FDBE396E42}" presName="imageaccent3" presStyleCnt="0"/>
@@ -5598,16 +5801,16 @@
     </dgm:pt>
   </dgm:ptLst>
   <dgm:cxnLst>
+    <dgm:cxn modelId="{921D8E84-9D2F-40AF-B445-7CE2DB225A88}" type="presOf" srcId="{373A95AD-8651-49D1-9C6D-D0522859B904}" destId="{AFE88DC7-C2CD-4A1C-B5BF-1FA643710F23}" srcOrd="0" destOrd="0" presId="urn:microsoft.com/office/officeart/2008/layout/HexagonCluster"/>
+    <dgm:cxn modelId="{C949EA41-1131-4266-8557-63B8F85BCA88}" type="presOf" srcId="{76A64321-FD6D-4FD1-8307-04639F009FB3}" destId="{8BAF9C75-494D-458A-9D7F-7CD6278D61C8}" srcOrd="0" destOrd="0" presId="urn:microsoft.com/office/officeart/2008/layout/HexagonCluster"/>
+    <dgm:cxn modelId="{C710263C-A0AD-4EEA-B413-66407596DE78}" srcId="{373A95AD-8651-49D1-9C6D-D0522859B904}" destId="{190D2D77-951B-47FB-AF03-C5EBC03C020A}" srcOrd="1" destOrd="0" parTransId="{EB6F1C15-3721-4CAF-82F3-B9CE40F26055}" sibTransId="{76A64321-FD6D-4FD1-8307-04639F009FB3}"/>
+    <dgm:cxn modelId="{29AB651B-DEB7-4F92-B56F-3ACC65523563}" type="presOf" srcId="{A82BC04C-E6C2-4B1B-BEF5-1F979631D76D}" destId="{ACDA988F-0C91-4F16-838A-55BC2EB25148}" srcOrd="0" destOrd="0" presId="urn:microsoft.com/office/officeart/2008/layout/HexagonCluster"/>
+    <dgm:cxn modelId="{D4B2EDDE-B72D-463E-AD55-A988CDA70068}" type="presOf" srcId="{9D427DDB-022D-470E-9D58-EE40886559D5}" destId="{61CC3104-DB9B-43C7-AD04-08930AD91261}" srcOrd="0" destOrd="0" presId="urn:microsoft.com/office/officeart/2008/layout/HexagonCluster"/>
+    <dgm:cxn modelId="{B2063B9B-3304-44D2-9938-0E34F4FD5E92}" srcId="{373A95AD-8651-49D1-9C6D-D0522859B904}" destId="{5B54F67F-3620-4EF1-AE33-D80DA4DA1A22}" srcOrd="2" destOrd="0" parTransId="{F44D26C2-BE09-4655-9F6F-55C7F9824D2F}" sibTransId="{5CC04077-0D0E-4333-8667-08FDBE396E42}"/>
     <dgm:cxn modelId="{8BA3F032-CBCE-4ADB-9E03-F9D22A981CEC}" srcId="{373A95AD-8651-49D1-9C6D-D0522859B904}" destId="{9D427DDB-022D-470E-9D58-EE40886559D5}" srcOrd="0" destOrd="0" parTransId="{0B22ACFC-2594-4172-80B2-79DC4DE77EE4}" sibTransId="{A82BC04C-E6C2-4B1B-BEF5-1F979631D76D}"/>
-    <dgm:cxn modelId="{29AB651B-DEB7-4F92-B56F-3ACC65523563}" type="presOf" srcId="{A82BC04C-E6C2-4B1B-BEF5-1F979631D76D}" destId="{ACDA988F-0C91-4F16-838A-55BC2EB25148}" srcOrd="0" destOrd="0" presId="urn:microsoft.com/office/officeart/2008/layout/HexagonCluster"/>
-    <dgm:cxn modelId="{C710263C-A0AD-4EEA-B413-66407596DE78}" srcId="{373A95AD-8651-49D1-9C6D-D0522859B904}" destId="{190D2D77-951B-47FB-AF03-C5EBC03C020A}" srcOrd="1" destOrd="0" parTransId="{EB6F1C15-3721-4CAF-82F3-B9CE40F26055}" sibTransId="{76A64321-FD6D-4FD1-8307-04639F009FB3}"/>
-    <dgm:cxn modelId="{D4B2EDDE-B72D-463E-AD55-A988CDA70068}" type="presOf" srcId="{9D427DDB-022D-470E-9D58-EE40886559D5}" destId="{61CC3104-DB9B-43C7-AD04-08930AD91261}" srcOrd="0" destOrd="0" presId="urn:microsoft.com/office/officeart/2008/layout/HexagonCluster"/>
-    <dgm:cxn modelId="{921D8E84-9D2F-40AF-B445-7CE2DB225A88}" type="presOf" srcId="{373A95AD-8651-49D1-9C6D-D0522859B904}" destId="{AFE88DC7-C2CD-4A1C-B5BF-1FA643710F23}" srcOrd="0" destOrd="0" presId="urn:microsoft.com/office/officeart/2008/layout/HexagonCluster"/>
     <dgm:cxn modelId="{5AA68B31-E0A1-4118-89C9-FC0006C96C4A}" type="presOf" srcId="{5CC04077-0D0E-4333-8667-08FDBE396E42}" destId="{78DA7A8D-10E3-4BDE-8D25-7F08876EF7A3}" srcOrd="0" destOrd="0" presId="urn:microsoft.com/office/officeart/2008/layout/HexagonCluster"/>
     <dgm:cxn modelId="{9A7681DD-0BDE-4E2C-8F46-59464A87DD5B}" type="presOf" srcId="{5B54F67F-3620-4EF1-AE33-D80DA4DA1A22}" destId="{7F7C6224-FB82-4447-9E73-7A33202E8187}" srcOrd="0" destOrd="0" presId="urn:microsoft.com/office/officeart/2008/layout/HexagonCluster"/>
-    <dgm:cxn modelId="{C949EA41-1131-4266-8557-63B8F85BCA88}" type="presOf" srcId="{76A64321-FD6D-4FD1-8307-04639F009FB3}" destId="{8BAF9C75-494D-458A-9D7F-7CD6278D61C8}" srcOrd="0" destOrd="0" presId="urn:microsoft.com/office/officeart/2008/layout/HexagonCluster"/>
     <dgm:cxn modelId="{78392B72-62B9-4499-8ADE-27BBFF304E7A}" type="presOf" srcId="{190D2D77-951B-47FB-AF03-C5EBC03C020A}" destId="{A113069A-AC28-46A4-AA18-ED375343A464}" srcOrd="0" destOrd="0" presId="urn:microsoft.com/office/officeart/2008/layout/HexagonCluster"/>
-    <dgm:cxn modelId="{B2063B9B-3304-44D2-9938-0E34F4FD5E92}" srcId="{373A95AD-8651-49D1-9C6D-D0522859B904}" destId="{5B54F67F-3620-4EF1-AE33-D80DA4DA1A22}" srcOrd="2" destOrd="0" parTransId="{F44D26C2-BE09-4655-9F6F-55C7F9824D2F}" sibTransId="{5CC04077-0D0E-4333-8667-08FDBE396E42}"/>
     <dgm:cxn modelId="{9B4CCBE1-7EDF-45F7-93CD-6E1EEFCDFCF6}" type="presParOf" srcId="{AFE88DC7-C2CD-4A1C-B5BF-1FA643710F23}" destId="{47D9A8BB-9D11-44B0-AD1B-D12B264BBFF1}" srcOrd="0" destOrd="0" presId="urn:microsoft.com/office/officeart/2008/layout/HexagonCluster"/>
     <dgm:cxn modelId="{875A367B-A2F1-42FB-999B-E53ECC60700B}" type="presParOf" srcId="{47D9A8BB-9D11-44B0-AD1B-D12B264BBFF1}" destId="{61CC3104-DB9B-43C7-AD04-08930AD91261}" srcOrd="0" destOrd="0" presId="urn:microsoft.com/office/officeart/2008/layout/HexagonCluster"/>
     <dgm:cxn modelId="{9D569486-A58E-46AC-96B8-F527822AD738}" type="presParOf" srcId="{AFE88DC7-C2CD-4A1C-B5BF-1FA643710F23}" destId="{22AA83C9-1AC9-43F4-A8D9-1E475E10C056}" srcOrd="1" destOrd="0" presId="urn:microsoft.com/office/officeart/2008/layout/HexagonCluster"/>
@@ -5703,6 +5906,13 @@
         </dgm:presLayoutVars>
       </dgm:prSet>
       <dgm:spPr/>
+      <dgm:t>
+        <a:bodyPr/>
+        <a:lstStyle/>
+        <a:p>
+          <a:endParaRPr lang="en-US"/>
+        </a:p>
+      </dgm:t>
     </dgm:pt>
     <dgm:pt modelId="{2AFF3B5A-4F05-4100-8BD2-5B48AC960E1D}" type="pres">
       <dgm:prSet presAssocID="{9D427DDB-022D-470E-9D58-EE40886559D5}" presName="composite" presStyleCnt="0">
@@ -5754,12 +5964,19 @@
         </dgm:presLayoutVars>
       </dgm:prSet>
       <dgm:spPr/>
+      <dgm:t>
+        <a:bodyPr/>
+        <a:lstStyle/>
+        <a:p>
+          <a:endParaRPr lang="en-US"/>
+        </a:p>
+      </dgm:t>
     </dgm:pt>
   </dgm:ptLst>
   <dgm:cxnLst>
+    <dgm:cxn modelId="{2C9D4079-390F-40D9-B807-592BD5726B01}" type="presOf" srcId="{373A95AD-8651-49D1-9C6D-D0522859B904}" destId="{A7F7F0AA-2966-4FF7-8732-B6640CF22F68}" srcOrd="0" destOrd="0" presId="urn:microsoft.com/office/officeart/2008/layout/CaptionedPictures"/>
     <dgm:cxn modelId="{FA8D673A-26FE-4BE5-845B-FCC53ACFF307}" type="presOf" srcId="{9D427DDB-022D-470E-9D58-EE40886559D5}" destId="{93BB3CE7-DA2F-4A11-B996-AFA715DEB9EA}" srcOrd="0" destOrd="0" presId="urn:microsoft.com/office/officeart/2008/layout/CaptionedPictures"/>
     <dgm:cxn modelId="{8BA3F032-CBCE-4ADB-9E03-F9D22A981CEC}" srcId="{373A95AD-8651-49D1-9C6D-D0522859B904}" destId="{9D427DDB-022D-470E-9D58-EE40886559D5}" srcOrd="0" destOrd="0" parTransId="{0B22ACFC-2594-4172-80B2-79DC4DE77EE4}" sibTransId="{A82BC04C-E6C2-4B1B-BEF5-1F979631D76D}"/>
-    <dgm:cxn modelId="{2C9D4079-390F-40D9-B807-592BD5726B01}" type="presOf" srcId="{373A95AD-8651-49D1-9C6D-D0522859B904}" destId="{A7F7F0AA-2966-4FF7-8732-B6640CF22F68}" srcOrd="0" destOrd="0" presId="urn:microsoft.com/office/officeart/2008/layout/CaptionedPictures"/>
     <dgm:cxn modelId="{8201A912-FD26-46D2-B9B9-F63B5E4C656E}" type="presParOf" srcId="{A7F7F0AA-2966-4FF7-8732-B6640CF22F68}" destId="{2AFF3B5A-4F05-4100-8BD2-5B48AC960E1D}" srcOrd="0" destOrd="0" presId="urn:microsoft.com/office/officeart/2008/layout/CaptionedPictures"/>
     <dgm:cxn modelId="{346EA3DD-F80E-4CA2-A6C0-ACB704DFB2CB}" type="presParOf" srcId="{2AFF3B5A-4F05-4100-8BD2-5B48AC960E1D}" destId="{77C87452-E8DB-496F-B69C-B6DE37D28F18}" srcOrd="0" destOrd="0" presId="urn:microsoft.com/office/officeart/2008/layout/CaptionedPictures"/>
     <dgm:cxn modelId="{0D25726E-95C3-49D4-8B37-4AAB57E85AD0}" type="presParOf" srcId="{2AFF3B5A-4F05-4100-8BD2-5B48AC960E1D}" destId="{F209E5C1-4445-4553-B252-D64D994709F4}" srcOrd="1" destOrd="0" presId="urn:microsoft.com/office/officeart/2008/layout/CaptionedPictures"/>
@@ -5872,7 +6089,7 @@
       </dsp:nvSpPr>
       <dsp:spPr>
         <a:xfrm>
-          <a:off x="990600" y="287698"/>
+          <a:off x="0" y="287698"/>
           <a:ext cx="945550" cy="474302"/>
         </a:xfrm>
         <a:prstGeom prst="rect">
@@ -5914,14 +6131,14 @@
             </a:spcAft>
           </a:pPr>
           <a:r>
-            <a:rPr lang="en-US" sz="1600" kern="1200" smtClean="0"/>
+            <a:rPr lang="en-US" sz="1600" kern="1200" dirty="0" smtClean="0"/>
             <a:t>Vision</a:t>
           </a:r>
           <a:endParaRPr lang="en-US" sz="1600" kern="1200" dirty="0"/>
         </a:p>
       </dsp:txBody>
       <dsp:txXfrm>
-        <a:off x="990600" y="287698"/>
+        <a:off x="0" y="287698"/>
         <a:ext cx="945550" cy="474302"/>
       </dsp:txXfrm>
     </dsp:sp>
@@ -6858,7 +7075,7 @@
       </dsp:nvSpPr>
       <dsp:spPr>
         <a:xfrm>
-          <a:off x="-52325" y="71097"/>
+          <a:off x="-52325" y="0"/>
           <a:ext cx="967370" cy="358382"/>
         </a:xfrm>
         <a:prstGeom prst="rect">
@@ -6907,7 +7124,7 @@
         </a:p>
       </dsp:txBody>
       <dsp:txXfrm>
-        <a:off x="-52325" y="71097"/>
+        <a:off x="-52325" y="0"/>
         <a:ext cx="967370" cy="358382"/>
       </dsp:txXfrm>
     </dsp:sp>
@@ -7967,7 +8184,7 @@
             </a:spcAft>
           </a:pPr>
           <a:r>
-            <a:rPr lang="en-US" sz="1400" kern="1200" smtClean="0"/>
+            <a:rPr lang="en-US" sz="1400" kern="1200" dirty="0" smtClean="0"/>
             <a:t> </a:t>
           </a:r>
           <a:endParaRPr lang="en-US" sz="1400" kern="1200" dirty="0"/>
@@ -20550,7 +20767,7 @@
           <a:p>
             <a:fld id="{D7F481C5-31F3-49DE-8EFC-FEAAB7356B04}" type="datetimeFigureOut">
               <a:rPr lang="en-US" smtClean="0"/>
-              <a:t>3/21/2015</a:t>
+              <a:t>3/22/2015</a:t>
             </a:fld>
             <a:endParaRPr lang="en-US"/>
           </a:p>
@@ -21000,7 +21217,7 @@
             <a:fld id="{1D8BD707-D9CF-40AE-B4C6-C98DA3205C09}" type="datetimeFigureOut">
               <a:rPr lang="en-US" smtClean="0"/>
               <a:pPr/>
-              <a:t>3/21/2015</a:t>
+              <a:t>3/22/2015</a:t>
             </a:fld>
             <a:endParaRPr lang="en-US"/>
           </a:p>
@@ -21167,7 +21384,7 @@
             <a:fld id="{1D8BD707-D9CF-40AE-B4C6-C98DA3205C09}" type="datetimeFigureOut">
               <a:rPr lang="en-US" smtClean="0"/>
               <a:pPr/>
-              <a:t>3/21/2015</a:t>
+              <a:t>3/22/2015</a:t>
             </a:fld>
             <a:endParaRPr lang="en-US"/>
           </a:p>
@@ -21344,7 +21561,7 @@
             <a:fld id="{1D8BD707-D9CF-40AE-B4C6-C98DA3205C09}" type="datetimeFigureOut">
               <a:rPr lang="en-US" smtClean="0"/>
               <a:pPr/>
-              <a:t>3/21/2015</a:t>
+              <a:t>3/22/2015</a:t>
             </a:fld>
             <a:endParaRPr lang="en-US"/>
           </a:p>
@@ -21511,7 +21728,7 @@
             <a:fld id="{1D8BD707-D9CF-40AE-B4C6-C98DA3205C09}" type="datetimeFigureOut">
               <a:rPr lang="en-US" smtClean="0"/>
               <a:pPr/>
-              <a:t>3/21/2015</a:t>
+              <a:t>3/22/2015</a:t>
             </a:fld>
             <a:endParaRPr lang="en-US"/>
           </a:p>
@@ -21754,7 +21971,7 @@
             <a:fld id="{1D8BD707-D9CF-40AE-B4C6-C98DA3205C09}" type="datetimeFigureOut">
               <a:rPr lang="en-US" smtClean="0"/>
               <a:pPr/>
-              <a:t>3/21/2015</a:t>
+              <a:t>3/22/2015</a:t>
             </a:fld>
             <a:endParaRPr lang="en-US"/>
           </a:p>
@@ -22039,7 +22256,7 @@
             <a:fld id="{1D8BD707-D9CF-40AE-B4C6-C98DA3205C09}" type="datetimeFigureOut">
               <a:rPr lang="en-US" smtClean="0"/>
               <a:pPr/>
-              <a:t>3/21/2015</a:t>
+              <a:t>3/22/2015</a:t>
             </a:fld>
             <a:endParaRPr lang="en-US"/>
           </a:p>
@@ -22458,7 +22675,7 @@
             <a:fld id="{1D8BD707-D9CF-40AE-B4C6-C98DA3205C09}" type="datetimeFigureOut">
               <a:rPr lang="en-US" smtClean="0"/>
               <a:pPr/>
-              <a:t>3/21/2015</a:t>
+              <a:t>3/22/2015</a:t>
             </a:fld>
             <a:endParaRPr lang="en-US"/>
           </a:p>
@@ -22573,7 +22790,7 @@
             <a:fld id="{1D8BD707-D9CF-40AE-B4C6-C98DA3205C09}" type="datetimeFigureOut">
               <a:rPr lang="en-US" smtClean="0"/>
               <a:pPr/>
-              <a:t>3/21/2015</a:t>
+              <a:t>3/22/2015</a:t>
             </a:fld>
             <a:endParaRPr lang="en-US"/>
           </a:p>
@@ -22665,7 +22882,7 @@
             <a:fld id="{1D8BD707-D9CF-40AE-B4C6-C98DA3205C09}" type="datetimeFigureOut">
               <a:rPr lang="en-US" smtClean="0"/>
               <a:pPr/>
-              <a:t>3/21/2015</a:t>
+              <a:t>3/22/2015</a:t>
             </a:fld>
             <a:endParaRPr lang="en-US"/>
           </a:p>
@@ -22939,7 +23156,7 @@
             <a:fld id="{1D8BD707-D9CF-40AE-B4C6-C98DA3205C09}" type="datetimeFigureOut">
               <a:rPr lang="en-US" smtClean="0"/>
               <a:pPr/>
-              <a:t>3/21/2015</a:t>
+              <a:t>3/22/2015</a:t>
             </a:fld>
             <a:endParaRPr lang="en-US"/>
           </a:p>
@@ -23189,7 +23406,7 @@
             <a:fld id="{1D8BD707-D9CF-40AE-B4C6-C98DA3205C09}" type="datetimeFigureOut">
               <a:rPr lang="en-US" smtClean="0"/>
               <a:pPr/>
-              <a:t>3/21/2015</a:t>
+              <a:t>3/22/2015</a:t>
             </a:fld>
             <a:endParaRPr lang="en-US"/>
           </a:p>
@@ -23399,7 +23616,7 @@
             <a:fld id="{1D8BD707-D9CF-40AE-B4C6-C98DA3205C09}" type="datetimeFigureOut">
               <a:rPr lang="en-US" smtClean="0"/>
               <a:pPr/>
-              <a:t>3/21/2015</a:t>
+              <a:t>3/22/2015</a:t>
             </a:fld>
             <a:endParaRPr lang="en-US"/>
           </a:p>
@@ -23777,7 +23994,7 @@
           <p:nvPr>
             <p:extLst>
               <p:ext uri="{D42A27DB-BD31-4B8C-83A1-F6EECF244321}">
-                <p14:modId xmlns:p14="http://schemas.microsoft.com/office/powerpoint/2010/main" val="4118845122"/>
+                <p14:modId xmlns:p14="http://schemas.microsoft.com/office/powerpoint/2010/main" val="2643227506"/>
               </p:ext>
             </p:extLst>
           </p:nvPr>
@@ -23836,7 +24053,7 @@
           <p:nvPr>
             <p:extLst>
               <p:ext uri="{D42A27DB-BD31-4B8C-83A1-F6EECF244321}">
-                <p14:modId xmlns:p14="http://schemas.microsoft.com/office/powerpoint/2010/main" val="1895257186"/>
+                <p14:modId xmlns:p14="http://schemas.microsoft.com/office/powerpoint/2010/main" val="741027040"/>
               </p:ext>
             </p:extLst>
           </p:nvPr>

</xml_diff>